<commit_message>
pdf and power update
</commit_message>
<xml_diff>
--- a/ai presentation.pptx
+++ b/ai presentation.pptx
@@ -12523,19 +12523,29 @@
         </p:nvSpPr>
         <p:spPr>
           <a:xfrm>
-            <a:off x="3418630" y="3605846"/>
-            <a:ext cx="5354739" cy="630936"/>
+            <a:off x="3333912" y="3605846"/>
+            <a:ext cx="5855999" cy="630936"/>
           </a:xfrm>
         </p:spPr>
         <p:txBody>
           <a:bodyPr/>
           <a:lstStyle/>
           <a:p>
+            <a:pPr algn="ctr"/>
             <a:r>
               <a:rPr lang="en-US" sz="1800" dirty="0">
                 <a:latin typeface="Archivo Black" panose="020B0A03020202020B04" pitchFamily="34" charset="0"/>
               </a:rPr>
-              <a:t>Paper Explained By Ali Reza Torabi</a:t>
+              <a:t>Paper Explained By Ali Reza Torabi,</a:t>
+            </a:r>
+          </a:p>
+          <a:p>
+            <a:pPr algn="ctr"/>
+            <a:r>
+              <a:rPr lang="en-US" sz="1800" dirty="0">
+                <a:latin typeface="Archivo Black" panose="020B0A03020202020B04" pitchFamily="34" charset="0"/>
+              </a:rPr>
+              <a:t>Amir Hossein Aghazadeh , Alireza Nosrati</a:t>
             </a:r>
           </a:p>
         </p:txBody>
@@ -14718,8 +14728,8 @@
         </p:blipFill>
         <p:spPr>
           <a:xfrm>
-            <a:off x="0" y="562087"/>
-            <a:ext cx="12192000" cy="6085705"/>
+            <a:off x="83975" y="562087"/>
+            <a:ext cx="12024049" cy="6085705"/>
           </a:xfrm>
           <a:prstGeom prst="rect">
             <a:avLst/>
@@ -15058,20 +15068,75 @@
         </p:nvSpPr>
         <p:spPr>
           <a:xfrm>
-            <a:off x="1215147" y="1581139"/>
-            <a:ext cx="6361310" cy="1664395"/>
+            <a:off x="1215147" y="1581140"/>
+            <a:ext cx="5894780" cy="2663312"/>
           </a:xfrm>
         </p:spPr>
         <p:txBody>
           <a:bodyPr/>
           <a:lstStyle/>
           <a:p>
-            <a:r>
-              <a:rPr lang="en-US" sz="2400" b="1" dirty="0">
-                <a:latin typeface="Sans Serif Collection" panose="020B0502040504020204" pitchFamily="34" charset="0"/>
+            <a:endParaRPr lang="en-US" sz="2400" b="1" dirty="0">
+              <a:latin typeface="Candara" panose="020E0502030303020204" pitchFamily="34" charset="0"/>
+              <a:ea typeface="Sans Serif Collection" panose="020B0502040504020204" pitchFamily="34" charset="0"/>
+              <a:cs typeface="Sans Serif Collection" panose="020B0502040504020204" pitchFamily="34" charset="0"/>
+              <a:hlinkClick r:id="rId2">
+                <a:extLst>
+                  <a:ext uri="{A12FA001-AC4F-418D-AE19-62706E023703}">
+                    <ahyp:hlinkClr xmlns:ahyp="http://schemas.microsoft.com/office/drawing/2018/hyperlinkcolor" val="tx"/>
+                  </a:ext>
+                </a:extLst>
+              </a:hlinkClick>
+            </a:endParaRPr>
+          </a:p>
+          <a:p>
+            <a:r>
+              <a:rPr lang="en-US" sz="2800" dirty="0">
+                <a:latin typeface="Archivo Black" panose="020B0A03020202020B04" pitchFamily="34" charset="0"/>
                 <a:ea typeface="Sans Serif Collection" panose="020B0502040504020204" pitchFamily="34" charset="0"/>
                 <a:cs typeface="Sans Serif Collection" panose="020B0502040504020204" pitchFamily="34" charset="0"/>
-                <a:hlinkClick r:id="rId2">
+              </a:rPr>
+              <a:t>My Portfolio Website:</a:t>
+            </a:r>
+          </a:p>
+          <a:p>
+            <a:r>
+              <a:rPr lang="en-US" sz="2800" dirty="0" err="1">
+                <a:latin typeface="Archivo Black" panose="020B0A03020202020B04" pitchFamily="34" charset="0"/>
+                <a:ea typeface="Sans Serif Collection" panose="020B0502040504020204" pitchFamily="34" charset="0"/>
+                <a:cs typeface="Sans Serif Collection" panose="020B0502040504020204" pitchFamily="34" charset="0"/>
+              </a:rPr>
+              <a:t>alirezatorabidev.vercel.app</a:t>
+            </a:r>
+            <a:endParaRPr lang="en-US" sz="2800" dirty="0">
+              <a:latin typeface="Archivo Black" panose="020B0A03020202020B04" pitchFamily="34" charset="0"/>
+              <a:ea typeface="Sans Serif Collection" panose="020B0502040504020204" pitchFamily="34" charset="0"/>
+              <a:cs typeface="Sans Serif Collection" panose="020B0502040504020204" pitchFamily="34" charset="0"/>
+            </a:endParaRPr>
+          </a:p>
+          <a:p>
+            <a:r>
+              <a:rPr lang="en-US" sz="2400" b="1" dirty="0">
+                <a:latin typeface="Candara" panose="020E0502030303020204" pitchFamily="34" charset="0"/>
+                <a:ea typeface="Sans Serif Collection" panose="020B0502040504020204" pitchFamily="34" charset="0"/>
+                <a:cs typeface="Sans Serif Collection" panose="020B0502040504020204" pitchFamily="34" charset="0"/>
+              </a:rPr>
+              <a:t>Files Available at : </a:t>
+            </a:r>
+          </a:p>
+          <a:p>
+            <a:r>
+              <a:rPr lang="en-US" sz="2000" dirty="0">
+                <a:solidFill>
+                  <a:schemeClr val="tx1">
+                    <a:lumMod val="75000"/>
+                    <a:lumOff val="25000"/>
+                  </a:schemeClr>
+                </a:solidFill>
+                <a:latin typeface="Candara" panose="020E0502030303020204" pitchFamily="34" charset="0"/>
+                <a:ea typeface="Sans Serif Collection" panose="020B0502040504020204" pitchFamily="34" charset="0"/>
+                <a:cs typeface="Sans Serif Collection" panose="020B0502040504020204" pitchFamily="34" charset="0"/>
+                <a:hlinkClick r:id="rId3">
                   <a:extLst>
                     <a:ext uri="{A12FA001-AC4F-418D-AE19-62706E023703}">
                       <ahyp:hlinkClr xmlns:ahyp="http://schemas.microsoft.com/office/drawing/2018/hyperlinkcolor" val="tx"/>
@@ -15079,55 +15144,62 @@
                   </a:extLst>
                 </a:hlinkClick>
               </a:rPr>
-              <a:t>www.alirezatorabidev.vercel.app</a:t>
-            </a:r>
-            <a:endParaRPr lang="en-US" sz="2400" b="1" dirty="0">
-              <a:latin typeface="Sans Serif Collection" panose="020B0502040504020204" pitchFamily="34" charset="0"/>
+              <a:t>github.com/</a:t>
+            </a:r>
+            <a:r>
+              <a:rPr lang="en-US" sz="2000" dirty="0" err="1">
+                <a:solidFill>
+                  <a:schemeClr val="tx1">
+                    <a:lumMod val="75000"/>
+                    <a:lumOff val="25000"/>
+                  </a:schemeClr>
+                </a:solidFill>
+                <a:latin typeface="Candara" panose="020E0502030303020204" pitchFamily="34" charset="0"/>
+                <a:ea typeface="Sans Serif Collection" panose="020B0502040504020204" pitchFamily="34" charset="0"/>
+                <a:cs typeface="Sans Serif Collection" panose="020B0502040504020204" pitchFamily="34" charset="0"/>
+                <a:hlinkClick r:id="rId3">
+                  <a:extLst>
+                    <a:ext uri="{A12FA001-AC4F-418D-AE19-62706E023703}">
+                      <ahyp:hlinkClr xmlns:ahyp="http://schemas.microsoft.com/office/drawing/2018/hyperlinkcolor" val="tx"/>
+                    </a:ext>
+                  </a:extLst>
+                </a:hlinkClick>
+              </a:rPr>
+              <a:t>nullxxnerd</a:t>
+            </a:r>
+            <a:r>
+              <a:rPr lang="en-US" sz="2000" dirty="0">
+                <a:solidFill>
+                  <a:schemeClr val="tx1">
+                    <a:lumMod val="75000"/>
+                    <a:lumOff val="25000"/>
+                  </a:schemeClr>
+                </a:solidFill>
+                <a:latin typeface="Candara" panose="020E0502030303020204" pitchFamily="34" charset="0"/>
+                <a:ea typeface="Sans Serif Collection" panose="020B0502040504020204" pitchFamily="34" charset="0"/>
+                <a:cs typeface="Sans Serif Collection" panose="020B0502040504020204" pitchFamily="34" charset="0"/>
+                <a:hlinkClick r:id="rId3">
+                  <a:extLst>
+                    <a:ext uri="{A12FA001-AC4F-418D-AE19-62706E023703}">
+                      <ahyp:hlinkClr xmlns:ahyp="http://schemas.microsoft.com/office/drawing/2018/hyperlinkcolor" val="tx"/>
+                    </a:ext>
+                  </a:extLst>
+                </a:hlinkClick>
+              </a:rPr>
+              <a:t>/deepseekR1-presentation</a:t>
+            </a:r>
+            <a:endParaRPr lang="en-US" sz="2400" dirty="0">
+              <a:solidFill>
+                <a:schemeClr val="tx1">
+                  <a:lumMod val="75000"/>
+                  <a:lumOff val="25000"/>
+                </a:schemeClr>
+              </a:solidFill>
+              <a:latin typeface="Candara" panose="020E0502030303020204" pitchFamily="34" charset="0"/>
               <a:ea typeface="Sans Serif Collection" panose="020B0502040504020204" pitchFamily="34" charset="0"/>
               <a:cs typeface="Sans Serif Collection" panose="020B0502040504020204" pitchFamily="34" charset="0"/>
             </a:endParaRPr>
           </a:p>
-          <a:p>
-            <a:r>
-              <a:rPr lang="en-US" sz="2400" b="1" dirty="0">
-                <a:latin typeface="Sans Serif Collection" panose="020B0502040504020204" pitchFamily="34" charset="0"/>
-                <a:ea typeface="Sans Serif Collection" panose="020B0502040504020204" pitchFamily="34" charset="0"/>
-                <a:cs typeface="Sans Serif Collection" panose="020B0502040504020204" pitchFamily="34" charset="0"/>
-              </a:rPr>
-              <a:t>Files Available at : </a:t>
-            </a:r>
-          </a:p>
-          <a:p>
-            <a:r>
-              <a:rPr lang="en-US" sz="2000" dirty="0">
-                <a:latin typeface="Sans Serif Collection" panose="020B0502040504020204" pitchFamily="34" charset="0"/>
-                <a:ea typeface="Sans Serif Collection" panose="020B0502040504020204" pitchFamily="34" charset="0"/>
-                <a:cs typeface="Sans Serif Collection" panose="020B0502040504020204" pitchFamily="34" charset="0"/>
-              </a:rPr>
-              <a:t>github.com/</a:t>
-            </a:r>
-            <a:r>
-              <a:rPr lang="en-US" sz="2000" dirty="0" err="1">
-                <a:latin typeface="Sans Serif Collection" panose="020B0502040504020204" pitchFamily="34" charset="0"/>
-                <a:ea typeface="Sans Serif Collection" panose="020B0502040504020204" pitchFamily="34" charset="0"/>
-                <a:cs typeface="Sans Serif Collection" panose="020B0502040504020204" pitchFamily="34" charset="0"/>
-              </a:rPr>
-              <a:t>nullxxnerd</a:t>
-            </a:r>
-            <a:r>
-              <a:rPr lang="en-US" sz="2000" dirty="0">
-                <a:latin typeface="Sans Serif Collection" panose="020B0502040504020204" pitchFamily="34" charset="0"/>
-                <a:ea typeface="Sans Serif Collection" panose="020B0502040504020204" pitchFamily="34" charset="0"/>
-                <a:cs typeface="Sans Serif Collection" panose="020B0502040504020204" pitchFamily="34" charset="0"/>
-              </a:rPr>
-              <a:t>/deepseekR1-presentation</a:t>
-            </a:r>
-            <a:endParaRPr lang="en-US" sz="2400" dirty="0">
-              <a:latin typeface="Sans Serif Collection" panose="020B0502040504020204" pitchFamily="34" charset="0"/>
-              <a:ea typeface="Sans Serif Collection" panose="020B0502040504020204" pitchFamily="34" charset="0"/>
-              <a:cs typeface="Sans Serif Collection" panose="020B0502040504020204" pitchFamily="34" charset="0"/>
-            </a:endParaRPr>
-          </a:p>
         </p:txBody>
       </p:sp>
       <p:sp>
@@ -15144,8 +15216,8 @@
         </p:nvSpPr>
         <p:spPr>
           <a:xfrm>
-            <a:off x="7576457" y="4366726"/>
-            <a:ext cx="3648269" cy="1015663"/>
+            <a:off x="7305871" y="1871365"/>
+            <a:ext cx="3885586" cy="2373086"/>
           </a:xfrm>
           <a:prstGeom prst="rect">
             <a:avLst/>
@@ -15159,22 +15231,92 @@
           <a:lstStyle/>
           <a:p>
             <a:r>
-              <a:rPr lang="en-US" sz="2000" dirty="0"/>
+              <a:rPr lang="en-US" sz="2000" dirty="0">
+                <a:latin typeface="Candara" panose="020E0502030303020204" pitchFamily="34" charset="0"/>
+              </a:rPr>
               <a:t>References:</a:t>
             </a:r>
             <a:br>
-              <a:rPr lang="en-US" sz="2000" dirty="0"/>
+              <a:rPr lang="en-US" sz="2000" dirty="0">
+                <a:latin typeface="Candara" panose="020E0502030303020204" pitchFamily="34" charset="0"/>
+              </a:rPr>
             </a:br>
             <a:r>
-              <a:rPr lang="en-US" sz="2000" dirty="0"/>
+              <a:rPr lang="en-US" sz="2000" dirty="0">
+                <a:latin typeface="Candara" panose="020E0502030303020204" pitchFamily="34" charset="0"/>
+              </a:rPr>
               <a:t>Sharif Machine Learning Course</a:t>
             </a:r>
           </a:p>
           <a:p>
-            <a:r>
-              <a:rPr lang="en-US" sz="2000" dirty="0"/>
+            <a:pPr>
+              <a:lnSpc>
+                <a:spcPct val="150000"/>
+              </a:lnSpc>
+            </a:pPr>
+            <a:r>
+              <a:rPr lang="en-US" sz="2000" dirty="0">
+                <a:solidFill>
+                  <a:schemeClr val="tx1">
+                    <a:lumMod val="75000"/>
+                    <a:lumOff val="25000"/>
+                  </a:schemeClr>
+                </a:solidFill>
+                <a:latin typeface="Candara" panose="020E0502030303020204" pitchFamily="34" charset="0"/>
+                <a:hlinkClick r:id="rId4">
+                  <a:extLst>
+                    <a:ext uri="{A12FA001-AC4F-418D-AE19-62706E023703}">
+                      <ahyp:hlinkClr xmlns:ahyp="http://schemas.microsoft.com/office/drawing/2018/hyperlinkcolor" val="tx"/>
+                    </a:ext>
+                  </a:extLst>
+                </a:hlinkClick>
+              </a:rPr>
               <a:t>https://github.com/hkproj</a:t>
             </a:r>
+            <a:endParaRPr lang="en-US" sz="2000" dirty="0">
+              <a:solidFill>
+                <a:schemeClr val="tx1">
+                  <a:lumMod val="75000"/>
+                  <a:lumOff val="25000"/>
+                </a:schemeClr>
+              </a:solidFill>
+              <a:latin typeface="Candara" panose="020E0502030303020204" pitchFamily="34" charset="0"/>
+            </a:endParaRPr>
+          </a:p>
+          <a:p>
+            <a:pPr>
+              <a:lnSpc>
+                <a:spcPct val="150000"/>
+              </a:lnSpc>
+            </a:pPr>
+            <a:r>
+              <a:rPr lang="en-US" dirty="0">
+                <a:solidFill>
+                  <a:schemeClr val="tx1">
+                    <a:lumMod val="75000"/>
+                    <a:lumOff val="25000"/>
+                  </a:schemeClr>
+                </a:solidFill>
+                <a:latin typeface="Candara" panose="020E0502030303020204" pitchFamily="34" charset="0"/>
+                <a:hlinkClick r:id="rId5">
+                  <a:extLst>
+                    <a:ext uri="{A12FA001-AC4F-418D-AE19-62706E023703}">
+                      <ahyp:hlinkClr xmlns:ahyp="http://schemas.microsoft.com/office/drawing/2018/hyperlinkcolor" val="tx"/>
+                    </a:ext>
+                  </a:extLst>
+                </a:hlinkClick>
+              </a:rPr>
+              <a:t>https://github.com/deepseek-ai/DeepSeek-R1/blob/main/DeepSeek_R1.pdf</a:t>
+            </a:r>
+            <a:endParaRPr lang="en-US" dirty="0">
+              <a:solidFill>
+                <a:schemeClr val="tx1">
+                  <a:lumMod val="75000"/>
+                  <a:lumOff val="25000"/>
+                </a:schemeClr>
+              </a:solidFill>
+              <a:latin typeface="Candara" panose="020E0502030303020204" pitchFamily="34" charset="0"/>
+            </a:endParaRPr>
           </a:p>
         </p:txBody>
       </p:sp>
@@ -17414,11 +17556,18 @@
 <file path=customXml/itemProps2.xml><?xml version="1.0" encoding="utf-8"?>
 <ds:datastoreItem xmlns:ds="http://schemas.openxmlformats.org/officeDocument/2006/customXml" ds:itemID="{61D9A46C-D3F3-4D45-B248-B831C6B5FC85}">
   <ds:schemaRefs>
+    <ds:schemaRef ds:uri="http://purl.org/dc/dcmitype/"/>
+    <ds:schemaRef ds:uri="http://purl.org/dc/terms/"/>
+    <ds:schemaRef ds:uri="http://schemas.microsoft.com/office/infopath/2007/PartnerControls"/>
+    <ds:schemaRef ds:uri="http://schemas.microsoft.com/office/2006/documentManagement/types"/>
+    <ds:schemaRef ds:uri="http://schemas.microsoft.com/sharepoint/v3"/>
+    <ds:schemaRef ds:uri="16c05727-aa75-4e4a-9b5f-8a80a1165891"/>
     <ds:schemaRef ds:uri="http://schemas.microsoft.com/office/2006/metadata/properties"/>
-    <ds:schemaRef ds:uri="http://schemas.microsoft.com/office/infopath/2007/PartnerControls"/>
-    <ds:schemaRef ds:uri="http://schemas.microsoft.com/sharepoint/v3"/>
+    <ds:schemaRef ds:uri="http://schemas.openxmlformats.org/package/2006/metadata/core-properties"/>
+    <ds:schemaRef ds:uri="http://purl.org/dc/elements/1.1/"/>
+    <ds:schemaRef ds:uri="230e9df3-be65-4c73-a93b-d1236ebd677e"/>
     <ds:schemaRef ds:uri="71af3243-3dd4-4a8d-8c0d-dd76da1f02a5"/>
-    <ds:schemaRef ds:uri="230e9df3-be65-4c73-a93b-d1236ebd677e"/>
+    <ds:schemaRef ds:uri="http://www.w3.org/XML/1998/namespace"/>
   </ds:schemaRefs>
 </ds:datastoreItem>
 </file>

</xml_diff>

<commit_message>
power point new page
</commit_message>
<xml_diff>
--- a/ai presentation.pptx
+++ b/ai presentation.pptx
@@ -5,7 +5,7 @@
     <p:sldMasterId id="2147483648" r:id="rId4"/>
   </p:sldMasterIdLst>
   <p:notesMasterIdLst>
-    <p:notesMasterId r:id="rId25"/>
+    <p:notesMasterId r:id="rId26"/>
   </p:notesMasterIdLst>
   <p:sldIdLst>
     <p:sldId id="284" r:id="rId5"/>
@@ -23,11 +23,12 @@
     <p:sldId id="302" r:id="rId17"/>
     <p:sldId id="308" r:id="rId18"/>
     <p:sldId id="310" r:id="rId19"/>
-    <p:sldId id="311" r:id="rId20"/>
-    <p:sldId id="312" r:id="rId21"/>
-    <p:sldId id="313" r:id="rId22"/>
-    <p:sldId id="315" r:id="rId23"/>
-    <p:sldId id="295" r:id="rId24"/>
+    <p:sldId id="316" r:id="rId20"/>
+    <p:sldId id="311" r:id="rId21"/>
+    <p:sldId id="312" r:id="rId22"/>
+    <p:sldId id="313" r:id="rId23"/>
+    <p:sldId id="315" r:id="rId24"/>
+    <p:sldId id="295" r:id="rId25"/>
   </p:sldIdLst>
   <p:sldSz cx="12192000" cy="6858000"/>
   <p:notesSz cx="6858000" cy="9144000"/>
@@ -258,7 +259,7 @@
           <a:p>
             <a:fld id="{C238102F-BFA3-4357-9FA0-3A064E6F1B5A}" type="datetimeFigureOut">
               <a:rPr lang="en-US" smtClean="0"/>
-              <a:t>5/5/2025</a:t>
+              <a:t>5/12/2025</a:t>
             </a:fld>
             <a:endParaRPr lang="en-US" dirty="0"/>
           </a:p>
@@ -14115,8 +14116,8 @@
         </p:blipFill>
         <p:spPr bwMode="auto">
           <a:xfrm>
-            <a:off x="0" y="709127"/>
-            <a:ext cx="12192000" cy="5938665"/>
+            <a:off x="0" y="578499"/>
+            <a:ext cx="12192000" cy="6069294"/>
           </a:xfrm>
           <a:prstGeom prst="rect">
             <a:avLst/>
@@ -14170,35 +14171,10 @@
       </p:grpSpPr>
       <p:sp>
         <p:nvSpPr>
-          <p:cNvPr id="2" name="Title 1">
-            <a:extLst>
-              <a:ext uri="{FF2B5EF4-FFF2-40B4-BE49-F238E27FC236}">
-                <a16:creationId xmlns:a16="http://schemas.microsoft.com/office/drawing/2014/main" id="{8F9394CC-E714-6316-2AB9-630FB2AEAE0A}"/>
-              </a:ext>
-            </a:extLst>
-          </p:cNvPr>
-          <p:cNvSpPr>
-            <a:spLocks noGrp="1"/>
-          </p:cNvSpPr>
-          <p:nvPr>
-            <p:ph type="title"/>
-          </p:nvPr>
-        </p:nvSpPr>
-        <p:spPr/>
-        <p:txBody>
-          <a:bodyPr/>
-          <a:lstStyle/>
-          <a:p>
-            <a:endParaRPr lang="en-US"/>
-          </a:p>
-        </p:txBody>
-      </p:sp>
-      <p:sp>
-        <p:nvSpPr>
-          <p:cNvPr id="3" name="Slide Number Placeholder 2">
-            <a:extLst>
-              <a:ext uri="{FF2B5EF4-FFF2-40B4-BE49-F238E27FC236}">
-                <a16:creationId xmlns:a16="http://schemas.microsoft.com/office/drawing/2014/main" id="{1A08C72A-E375-340C-FEB5-0A9BBA3150E2}"/>
+          <p:cNvPr id="2" name="Slide Number Placeholder 1">
+            <a:extLst>
+              <a:ext uri="{FF2B5EF4-FFF2-40B4-BE49-F238E27FC236}">
+                <a16:creationId xmlns:a16="http://schemas.microsoft.com/office/drawing/2014/main" id="{6C9DD1B4-77D5-66CE-3BF8-E4B87E94C5CE}"/>
               </a:ext>
             </a:extLst>
           </p:cNvPr>
@@ -14224,10 +14200,10 @@
       </p:sp>
       <p:sp>
         <p:nvSpPr>
-          <p:cNvPr id="4" name="Footer Placeholder 3">
-            <a:extLst>
-              <a:ext uri="{FF2B5EF4-FFF2-40B4-BE49-F238E27FC236}">
-                <a16:creationId xmlns:a16="http://schemas.microsoft.com/office/drawing/2014/main" id="{126518AB-E8F7-1C8A-7DC6-39F91C04D1B9}"/>
+          <p:cNvPr id="3" name="Footer Placeholder 2">
+            <a:extLst>
+              <a:ext uri="{FF2B5EF4-FFF2-40B4-BE49-F238E27FC236}">
+                <a16:creationId xmlns:a16="http://schemas.microsoft.com/office/drawing/2014/main" id="{2935A71A-CB6F-3114-D9E6-636E4F706650}"/>
               </a:ext>
             </a:extLst>
           </p:cNvPr>
@@ -14252,10 +14228,10 @@
       </p:sp>
       <p:sp>
         <p:nvSpPr>
-          <p:cNvPr id="5" name="Date Placeholder 4">
-            <a:extLst>
-              <a:ext uri="{FF2B5EF4-FFF2-40B4-BE49-F238E27FC236}">
-                <a16:creationId xmlns:a16="http://schemas.microsoft.com/office/drawing/2014/main" id="{B49731F6-89D4-FD4F-C41E-66A1E9AA099C}"/>
+          <p:cNvPr id="4" name="Date Placeholder 3">
+            <a:extLst>
+              <a:ext uri="{FF2B5EF4-FFF2-40B4-BE49-F238E27FC236}">
+                <a16:creationId xmlns:a16="http://schemas.microsoft.com/office/drawing/2014/main" id="{4E3A0E07-0B40-E778-6925-EDA35E005E34}"/>
               </a:ext>
             </a:extLst>
           </p:cNvPr>
@@ -14280,10 +14256,10 @@
       </p:sp>
       <p:pic>
         <p:nvPicPr>
-          <p:cNvPr id="8" name="Picture 7">
-            <a:extLst>
-              <a:ext uri="{FF2B5EF4-FFF2-40B4-BE49-F238E27FC236}">
-                <a16:creationId xmlns:a16="http://schemas.microsoft.com/office/drawing/2014/main" id="{BF4BE46C-B68B-5619-7A4B-0AD09D0B7668}"/>
+          <p:cNvPr id="9" name="Picture 8" descr="A diagram of a diagram&#10;&#10;AI-generated content may be incorrect.">
+            <a:extLst>
+              <a:ext uri="{FF2B5EF4-FFF2-40B4-BE49-F238E27FC236}">
+                <a16:creationId xmlns:a16="http://schemas.microsoft.com/office/drawing/2014/main" id="{E96715E8-43F4-986B-B8EB-274C3E674807}"/>
               </a:ext>
             </a:extLst>
           </p:cNvPr>
@@ -14294,13 +14270,14 @@
         </p:nvPicPr>
         <p:blipFill>
           <a:blip r:embed="rId2"/>
-          <a:srcRect l="3515" r="2944"/>
-          <a:stretch/>
+          <a:stretch>
+            <a:fillRect/>
+          </a:stretch>
         </p:blipFill>
         <p:spPr>
           <a:xfrm>
-            <a:off x="0" y="0"/>
-            <a:ext cx="12169210" cy="6858000"/>
+            <a:off x="0" y="1390"/>
+            <a:ext cx="12192000" cy="6855220"/>
           </a:xfrm>
           <a:prstGeom prst="rect">
             <a:avLst/>
@@ -14310,7 +14287,7 @@
     </p:spTree>
     <p:extLst>
       <p:ext uri="{BB962C8B-B14F-4D97-AF65-F5344CB8AC3E}">
-        <p14:creationId xmlns:p14="http://schemas.microsoft.com/office/powerpoint/2010/main" val="3835078863"/>
+        <p14:creationId xmlns:p14="http://schemas.microsoft.com/office/powerpoint/2010/main" val="713974572"/>
       </p:ext>
     </p:extLst>
   </p:cSld>
@@ -14323,14 +14300,6 @@
 <file path=ppt/slides/slide17.xml><?xml version="1.0" encoding="utf-8"?>
 <p:sld xmlns:a="http://schemas.openxmlformats.org/drawingml/2006/main" xmlns:r="http://schemas.openxmlformats.org/officeDocument/2006/relationships" xmlns:p="http://schemas.openxmlformats.org/presentationml/2006/main">
   <p:cSld>
-    <p:bg>
-      <p:bgPr>
-        <a:solidFill>
-          <a:schemeClr val="bg1"/>
-        </a:solidFill>
-        <a:effectLst/>
-      </p:bgPr>
-    </p:bg>
     <p:spTree>
       <p:nvGrpSpPr>
         <p:cNvPr id="1" name=""/>
@@ -14347,10 +14316,35 @@
       </p:grpSpPr>
       <p:sp>
         <p:nvSpPr>
-          <p:cNvPr id="2" name="Slide Number Placeholder 1">
-            <a:extLst>
-              <a:ext uri="{FF2B5EF4-FFF2-40B4-BE49-F238E27FC236}">
-                <a16:creationId xmlns:a16="http://schemas.microsoft.com/office/drawing/2014/main" id="{A3B37477-F336-3BD9-5B14-EA7246416897}"/>
+          <p:cNvPr id="2" name="Title 1">
+            <a:extLst>
+              <a:ext uri="{FF2B5EF4-FFF2-40B4-BE49-F238E27FC236}">
+                <a16:creationId xmlns:a16="http://schemas.microsoft.com/office/drawing/2014/main" id="{8F9394CC-E714-6316-2AB9-630FB2AEAE0A}"/>
+              </a:ext>
+            </a:extLst>
+          </p:cNvPr>
+          <p:cNvSpPr>
+            <a:spLocks noGrp="1"/>
+          </p:cNvSpPr>
+          <p:nvPr>
+            <p:ph type="title"/>
+          </p:nvPr>
+        </p:nvSpPr>
+        <p:spPr/>
+        <p:txBody>
+          <a:bodyPr/>
+          <a:lstStyle/>
+          <a:p>
+            <a:endParaRPr lang="en-US"/>
+          </a:p>
+        </p:txBody>
+      </p:sp>
+      <p:sp>
+        <p:nvSpPr>
+          <p:cNvPr id="3" name="Slide Number Placeholder 2">
+            <a:extLst>
+              <a:ext uri="{FF2B5EF4-FFF2-40B4-BE49-F238E27FC236}">
+                <a16:creationId xmlns:a16="http://schemas.microsoft.com/office/drawing/2014/main" id="{1A08C72A-E375-340C-FEB5-0A9BBA3150E2}"/>
               </a:ext>
             </a:extLst>
           </p:cNvPr>
@@ -14370,53 +14364,99 @@
               <a:rPr lang="en-US" noProof="0" smtClean="0"/>
               <a:t>17</a:t>
             </a:fld>
-            <a:endParaRPr lang="en-US" noProof="0" dirty="0"/>
-          </a:p>
-        </p:txBody>
-      </p:sp>
-      <p:sp>
-        <p:nvSpPr>
-          <p:cNvPr id="6" name="TextBox 5">
-            <a:extLst>
-              <a:ext uri="{FF2B5EF4-FFF2-40B4-BE49-F238E27FC236}">
-                <a16:creationId xmlns:a16="http://schemas.microsoft.com/office/drawing/2014/main" id="{930F469A-744D-A53A-9963-46E7270E9CE7}"/>
-              </a:ext>
-            </a:extLst>
-          </p:cNvPr>
-          <p:cNvSpPr txBox="1"/>
+            <a:endParaRPr lang="en-US" noProof="0"/>
+          </a:p>
+        </p:txBody>
+      </p:sp>
+      <p:sp>
+        <p:nvSpPr>
+          <p:cNvPr id="4" name="Footer Placeholder 3">
+            <a:extLst>
+              <a:ext uri="{FF2B5EF4-FFF2-40B4-BE49-F238E27FC236}">
+                <a16:creationId xmlns:a16="http://schemas.microsoft.com/office/drawing/2014/main" id="{126518AB-E8F7-1C8A-7DC6-39F91C04D1B9}"/>
+              </a:ext>
+            </a:extLst>
+          </p:cNvPr>
+          <p:cNvSpPr>
+            <a:spLocks noGrp="1"/>
+          </p:cNvSpPr>
+          <p:nvPr>
+            <p:ph type="ftr" sz="quarter" idx="11"/>
+          </p:nvPr>
+        </p:nvSpPr>
+        <p:spPr/>
+        <p:txBody>
+          <a:bodyPr/>
+          <a:lstStyle/>
+          <a:p>
+            <a:r>
+              <a:rPr lang="en-US" noProof="0"/>
+              <a:t>Presentation title</a:t>
+            </a:r>
+          </a:p>
+        </p:txBody>
+      </p:sp>
+      <p:sp>
+        <p:nvSpPr>
+          <p:cNvPr id="5" name="Date Placeholder 4">
+            <a:extLst>
+              <a:ext uri="{FF2B5EF4-FFF2-40B4-BE49-F238E27FC236}">
+                <a16:creationId xmlns:a16="http://schemas.microsoft.com/office/drawing/2014/main" id="{B49731F6-89D4-FD4F-C41E-66A1E9AA099C}"/>
+              </a:ext>
+            </a:extLst>
+          </p:cNvPr>
+          <p:cNvSpPr>
+            <a:spLocks noGrp="1"/>
+          </p:cNvSpPr>
+          <p:nvPr>
+            <p:ph type="dt" sz="half" idx="10"/>
+          </p:nvPr>
+        </p:nvSpPr>
+        <p:spPr/>
+        <p:txBody>
+          <a:bodyPr/>
+          <a:lstStyle/>
+          <a:p>
+            <a:r>
+              <a:rPr lang="en-US" noProof="0"/>
+              <a:t>20XX</a:t>
+            </a:r>
+          </a:p>
+        </p:txBody>
+      </p:sp>
+      <p:pic>
+        <p:nvPicPr>
+          <p:cNvPr id="8" name="Picture 7">
+            <a:extLst>
+              <a:ext uri="{FF2B5EF4-FFF2-40B4-BE49-F238E27FC236}">
+                <a16:creationId xmlns:a16="http://schemas.microsoft.com/office/drawing/2014/main" id="{BF4BE46C-B68B-5619-7A4B-0AD09D0B7668}"/>
+              </a:ext>
+            </a:extLst>
+          </p:cNvPr>
+          <p:cNvPicPr>
+            <a:picLocks noChangeAspect="1"/>
+          </p:cNvPicPr>
           <p:nvPr/>
-        </p:nvSpPr>
-        <p:spPr>
-          <a:xfrm>
-            <a:off x="898694" y="1183965"/>
-            <a:ext cx="10394612" cy="2862322"/>
+        </p:nvPicPr>
+        <p:blipFill>
+          <a:blip r:embed="rId2"/>
+          <a:srcRect l="3515" r="2944"/>
+          <a:stretch/>
+        </p:blipFill>
+        <p:spPr>
+          <a:xfrm>
+            <a:off x="0" y="0"/>
+            <a:ext cx="12169210" cy="6858000"/>
           </a:xfrm>
           <a:prstGeom prst="rect">
             <a:avLst/>
           </a:prstGeom>
-          <a:noFill/>
-        </p:spPr>
-        <p:txBody>
-          <a:bodyPr wrap="square">
-            <a:spAutoFit/>
-          </a:bodyPr>
-          <a:lstStyle/>
-          <a:p>
-            <a:r>
-              <a:rPr lang="en-US" sz="3600" dirty="0">
-                <a:latin typeface="Aptos Narrow" panose="020B0004020202020204" pitchFamily="34" charset="0"/>
-                <a:ea typeface="Sans Serif Collection" panose="020B0502040504020204" pitchFamily="34" charset="0"/>
-                <a:cs typeface="Sans Serif Collection" panose="020B0502040504020204" pitchFamily="34" charset="0"/>
-              </a:rPr>
-              <a:t>An interesting “aha moment” of an intermediate version of DeepSeek-R1-Zero. The model learns to rethink using an anthropomorphic tone. This is also an aha moment for us, allowing us to witness the power and beauty of reinforcement learning. </a:t>
-            </a:r>
-          </a:p>
-        </p:txBody>
-      </p:sp>
+        </p:spPr>
+      </p:pic>
     </p:spTree>
     <p:extLst>
       <p:ext uri="{BB962C8B-B14F-4D97-AF65-F5344CB8AC3E}">
-        <p14:creationId xmlns:p14="http://schemas.microsoft.com/office/powerpoint/2010/main" val="235526259"/>
+        <p14:creationId xmlns:p14="http://schemas.microsoft.com/office/powerpoint/2010/main" val="3835078863"/>
       </p:ext>
     </p:extLst>
   </p:cSld>
@@ -14453,35 +14493,10 @@
       </p:grpSpPr>
       <p:sp>
         <p:nvSpPr>
-          <p:cNvPr id="2" name="Title 1">
-            <a:extLst>
-              <a:ext uri="{FF2B5EF4-FFF2-40B4-BE49-F238E27FC236}">
-                <a16:creationId xmlns:a16="http://schemas.microsoft.com/office/drawing/2014/main" id="{9B87AC33-64DF-4E12-AACF-C61C80CCB52F}"/>
-              </a:ext>
-            </a:extLst>
-          </p:cNvPr>
-          <p:cNvSpPr>
-            <a:spLocks noGrp="1"/>
-          </p:cNvSpPr>
-          <p:nvPr>
-            <p:ph type="title"/>
-          </p:nvPr>
-        </p:nvSpPr>
-        <p:spPr/>
-        <p:txBody>
-          <a:bodyPr/>
-          <a:lstStyle/>
-          <a:p>
-            <a:endParaRPr lang="en-US"/>
-          </a:p>
-        </p:txBody>
-      </p:sp>
-      <p:sp>
-        <p:nvSpPr>
-          <p:cNvPr id="3" name="Slide Number Placeholder 2">
-            <a:extLst>
-              <a:ext uri="{FF2B5EF4-FFF2-40B4-BE49-F238E27FC236}">
-                <a16:creationId xmlns:a16="http://schemas.microsoft.com/office/drawing/2014/main" id="{4AAE2833-7F8A-1B31-60CD-51B75FB2B8E8}"/>
+          <p:cNvPr id="2" name="Slide Number Placeholder 1">
+            <a:extLst>
+              <a:ext uri="{FF2B5EF4-FFF2-40B4-BE49-F238E27FC236}">
+                <a16:creationId xmlns:a16="http://schemas.microsoft.com/office/drawing/2014/main" id="{A3B37477-F336-3BD9-5B14-EA7246416897}"/>
               </a:ext>
             </a:extLst>
           </p:cNvPr>
@@ -14501,100 +14516,53 @@
               <a:rPr lang="en-US" noProof="0" smtClean="0"/>
               <a:t>18</a:t>
             </a:fld>
-            <a:endParaRPr lang="en-US" noProof="0"/>
-          </a:p>
-        </p:txBody>
-      </p:sp>
-      <p:sp>
-        <p:nvSpPr>
-          <p:cNvPr id="4" name="Footer Placeholder 3">
-            <a:extLst>
-              <a:ext uri="{FF2B5EF4-FFF2-40B4-BE49-F238E27FC236}">
-                <a16:creationId xmlns:a16="http://schemas.microsoft.com/office/drawing/2014/main" id="{DED0441B-1D2F-1D45-3732-8107DCC24669}"/>
-              </a:ext>
-            </a:extLst>
-          </p:cNvPr>
-          <p:cNvSpPr>
-            <a:spLocks noGrp="1"/>
-          </p:cNvSpPr>
-          <p:nvPr>
-            <p:ph type="ftr" sz="quarter" idx="11"/>
-          </p:nvPr>
-        </p:nvSpPr>
-        <p:spPr/>
-        <p:txBody>
-          <a:bodyPr/>
-          <a:lstStyle/>
-          <a:p>
-            <a:r>
-              <a:rPr lang="en-US" noProof="0"/>
-              <a:t>Presentation title</a:t>
-            </a:r>
-          </a:p>
-        </p:txBody>
-      </p:sp>
-      <p:sp>
-        <p:nvSpPr>
-          <p:cNvPr id="5" name="Date Placeholder 4">
-            <a:extLst>
-              <a:ext uri="{FF2B5EF4-FFF2-40B4-BE49-F238E27FC236}">
-                <a16:creationId xmlns:a16="http://schemas.microsoft.com/office/drawing/2014/main" id="{74966681-64FF-D603-2175-1600A9B68A7B}"/>
-              </a:ext>
-            </a:extLst>
-          </p:cNvPr>
-          <p:cNvSpPr>
-            <a:spLocks noGrp="1"/>
-          </p:cNvSpPr>
-          <p:nvPr>
-            <p:ph type="dt" sz="half" idx="10"/>
-          </p:nvPr>
-        </p:nvSpPr>
-        <p:spPr/>
-        <p:txBody>
-          <a:bodyPr/>
-          <a:lstStyle/>
-          <a:p>
-            <a:r>
-              <a:rPr lang="en-US" noProof="0"/>
-              <a:t>20XX</a:t>
-            </a:r>
-          </a:p>
-        </p:txBody>
-      </p:sp>
-      <p:pic>
-        <p:nvPicPr>
-          <p:cNvPr id="7" name="Picture 6">
-            <a:extLst>
-              <a:ext uri="{FF2B5EF4-FFF2-40B4-BE49-F238E27FC236}">
-                <a16:creationId xmlns:a16="http://schemas.microsoft.com/office/drawing/2014/main" id="{FAF55AF8-E217-F36B-05BC-358A7DE53E22}"/>
-              </a:ext>
-            </a:extLst>
-          </p:cNvPr>
-          <p:cNvPicPr>
-            <a:picLocks noChangeAspect="1"/>
-          </p:cNvPicPr>
+            <a:endParaRPr lang="en-US" noProof="0" dirty="0"/>
+          </a:p>
+        </p:txBody>
+      </p:sp>
+      <p:sp>
+        <p:nvSpPr>
+          <p:cNvPr id="6" name="TextBox 5">
+            <a:extLst>
+              <a:ext uri="{FF2B5EF4-FFF2-40B4-BE49-F238E27FC236}">
+                <a16:creationId xmlns:a16="http://schemas.microsoft.com/office/drawing/2014/main" id="{930F469A-744D-A53A-9963-46E7270E9CE7}"/>
+              </a:ext>
+            </a:extLst>
+          </p:cNvPr>
+          <p:cNvSpPr txBox="1"/>
           <p:nvPr/>
-        </p:nvPicPr>
-        <p:blipFill>
-          <a:blip r:embed="rId2"/>
-          <a:stretch>
-            <a:fillRect/>
-          </a:stretch>
-        </p:blipFill>
-        <p:spPr>
-          <a:xfrm>
-            <a:off x="363894" y="0"/>
-            <a:ext cx="11215396" cy="6858000"/>
+        </p:nvSpPr>
+        <p:spPr>
+          <a:xfrm>
+            <a:off x="898694" y="1183965"/>
+            <a:ext cx="10394612" cy="2862322"/>
           </a:xfrm>
           <a:prstGeom prst="rect">
             <a:avLst/>
           </a:prstGeom>
-        </p:spPr>
-      </p:pic>
+          <a:noFill/>
+        </p:spPr>
+        <p:txBody>
+          <a:bodyPr wrap="square">
+            <a:spAutoFit/>
+          </a:bodyPr>
+          <a:lstStyle/>
+          <a:p>
+            <a:r>
+              <a:rPr lang="en-US" sz="3600" dirty="0">
+                <a:latin typeface="Aptos Narrow" panose="020B0004020202020204" pitchFamily="34" charset="0"/>
+                <a:ea typeface="Sans Serif Collection" panose="020B0502040504020204" pitchFamily="34" charset="0"/>
+                <a:cs typeface="Sans Serif Collection" panose="020B0502040504020204" pitchFamily="34" charset="0"/>
+              </a:rPr>
+              <a:t>An interesting “aha moment” of an intermediate version of DeepSeek-R1-Zero. The model learns to rethink using an anthropomorphic tone. This is also an aha moment for us, allowing us to witness the power and beauty of reinforcement learning. </a:t>
+            </a:r>
+          </a:p>
+        </p:txBody>
+      </p:sp>
     </p:spTree>
     <p:extLst>
       <p:ext uri="{BB962C8B-B14F-4D97-AF65-F5344CB8AC3E}">
-        <p14:creationId xmlns:p14="http://schemas.microsoft.com/office/powerpoint/2010/main" val="472939540"/>
+        <p14:creationId xmlns:p14="http://schemas.microsoft.com/office/powerpoint/2010/main" val="235526259"/>
       </p:ext>
     </p:extLst>
   </p:cSld>
@@ -14631,10 +14599,35 @@
       </p:grpSpPr>
       <p:sp>
         <p:nvSpPr>
-          <p:cNvPr id="2" name="Slide Number Placeholder 1">
-            <a:extLst>
-              <a:ext uri="{FF2B5EF4-FFF2-40B4-BE49-F238E27FC236}">
-                <a16:creationId xmlns:a16="http://schemas.microsoft.com/office/drawing/2014/main" id="{0C0A4A44-0DD6-B7B2-02FE-EA98070564CD}"/>
+          <p:cNvPr id="2" name="Title 1">
+            <a:extLst>
+              <a:ext uri="{FF2B5EF4-FFF2-40B4-BE49-F238E27FC236}">
+                <a16:creationId xmlns:a16="http://schemas.microsoft.com/office/drawing/2014/main" id="{9B87AC33-64DF-4E12-AACF-C61C80CCB52F}"/>
+              </a:ext>
+            </a:extLst>
+          </p:cNvPr>
+          <p:cNvSpPr>
+            <a:spLocks noGrp="1"/>
+          </p:cNvSpPr>
+          <p:nvPr>
+            <p:ph type="title"/>
+          </p:nvPr>
+        </p:nvSpPr>
+        <p:spPr/>
+        <p:txBody>
+          <a:bodyPr/>
+          <a:lstStyle/>
+          <a:p>
+            <a:endParaRPr lang="en-US"/>
+          </a:p>
+        </p:txBody>
+      </p:sp>
+      <p:sp>
+        <p:nvSpPr>
+          <p:cNvPr id="3" name="Slide Number Placeholder 2">
+            <a:extLst>
+              <a:ext uri="{FF2B5EF4-FFF2-40B4-BE49-F238E27FC236}">
+                <a16:creationId xmlns:a16="http://schemas.microsoft.com/office/drawing/2014/main" id="{4AAE2833-7F8A-1B31-60CD-51B75FB2B8E8}"/>
               </a:ext>
             </a:extLst>
           </p:cNvPr>
@@ -14660,10 +14653,10 @@
       </p:sp>
       <p:sp>
         <p:nvSpPr>
-          <p:cNvPr id="3" name="Footer Placeholder 2">
-            <a:extLst>
-              <a:ext uri="{FF2B5EF4-FFF2-40B4-BE49-F238E27FC236}">
-                <a16:creationId xmlns:a16="http://schemas.microsoft.com/office/drawing/2014/main" id="{231C9157-8CBF-F340-6AE1-4A31DC33EB23}"/>
+          <p:cNvPr id="4" name="Footer Placeholder 3">
+            <a:extLst>
+              <a:ext uri="{FF2B5EF4-FFF2-40B4-BE49-F238E27FC236}">
+                <a16:creationId xmlns:a16="http://schemas.microsoft.com/office/drawing/2014/main" id="{DED0441B-1D2F-1D45-3732-8107DCC24669}"/>
               </a:ext>
             </a:extLst>
           </p:cNvPr>
@@ -14688,10 +14681,10 @@
       </p:sp>
       <p:sp>
         <p:nvSpPr>
-          <p:cNvPr id="4" name="Date Placeholder 3">
-            <a:extLst>
-              <a:ext uri="{FF2B5EF4-FFF2-40B4-BE49-F238E27FC236}">
-                <a16:creationId xmlns:a16="http://schemas.microsoft.com/office/drawing/2014/main" id="{F29FF13C-D598-EA2C-4499-D19FA0DD7A30}"/>
+          <p:cNvPr id="5" name="Date Placeholder 4">
+            <a:extLst>
+              <a:ext uri="{FF2B5EF4-FFF2-40B4-BE49-F238E27FC236}">
+                <a16:creationId xmlns:a16="http://schemas.microsoft.com/office/drawing/2014/main" id="{74966681-64FF-D603-2175-1600A9B68A7B}"/>
               </a:ext>
             </a:extLst>
           </p:cNvPr>
@@ -14716,10 +14709,10 @@
       </p:sp>
       <p:pic>
         <p:nvPicPr>
-          <p:cNvPr id="6" name="Picture 5">
-            <a:extLst>
-              <a:ext uri="{FF2B5EF4-FFF2-40B4-BE49-F238E27FC236}">
-                <a16:creationId xmlns:a16="http://schemas.microsoft.com/office/drawing/2014/main" id="{3824BE9C-7C4B-6C0B-861B-3ACA2AF333ED}"/>
+          <p:cNvPr id="7" name="Picture 6">
+            <a:extLst>
+              <a:ext uri="{FF2B5EF4-FFF2-40B4-BE49-F238E27FC236}">
+                <a16:creationId xmlns:a16="http://schemas.microsoft.com/office/drawing/2014/main" id="{FAF55AF8-E217-F36B-05BC-358A7DE53E22}"/>
               </a:ext>
             </a:extLst>
           </p:cNvPr>
@@ -14736,8 +14729,8 @@
         </p:blipFill>
         <p:spPr>
           <a:xfrm>
-            <a:off x="83975" y="562087"/>
-            <a:ext cx="12024049" cy="6085705"/>
+            <a:off x="363894" y="0"/>
+            <a:ext cx="11215396" cy="6858000"/>
           </a:xfrm>
           <a:prstGeom prst="rect">
             <a:avLst/>
@@ -14747,7 +14740,7 @@
     </p:spTree>
     <p:extLst>
       <p:ext uri="{BB962C8B-B14F-4D97-AF65-F5344CB8AC3E}">
-        <p14:creationId xmlns:p14="http://schemas.microsoft.com/office/powerpoint/2010/main" val="4048157958"/>
+        <p14:creationId xmlns:p14="http://schemas.microsoft.com/office/powerpoint/2010/main" val="472939540"/>
       </p:ext>
     </p:extLst>
   </p:cSld>
@@ -15042,6 +15035,159 @@
 </file>
 
 <file path=ppt/slides/slide20.xml><?xml version="1.0" encoding="utf-8"?>
+<p:sld xmlns:a="http://schemas.openxmlformats.org/drawingml/2006/main" xmlns:r="http://schemas.openxmlformats.org/officeDocument/2006/relationships" xmlns:p="http://schemas.openxmlformats.org/presentationml/2006/main">
+  <p:cSld>
+    <p:bg>
+      <p:bgPr>
+        <a:solidFill>
+          <a:schemeClr val="bg1"/>
+        </a:solidFill>
+        <a:effectLst/>
+      </p:bgPr>
+    </p:bg>
+    <p:spTree>
+      <p:nvGrpSpPr>
+        <p:cNvPr id="1" name=""/>
+        <p:cNvGrpSpPr/>
+        <p:nvPr/>
+      </p:nvGrpSpPr>
+      <p:grpSpPr>
+        <a:xfrm>
+          <a:off x="0" y="0"/>
+          <a:ext cx="0" cy="0"/>
+          <a:chOff x="0" y="0"/>
+          <a:chExt cx="0" cy="0"/>
+        </a:xfrm>
+      </p:grpSpPr>
+      <p:sp>
+        <p:nvSpPr>
+          <p:cNvPr id="2" name="Slide Number Placeholder 1">
+            <a:extLst>
+              <a:ext uri="{FF2B5EF4-FFF2-40B4-BE49-F238E27FC236}">
+                <a16:creationId xmlns:a16="http://schemas.microsoft.com/office/drawing/2014/main" id="{0C0A4A44-0DD6-B7B2-02FE-EA98070564CD}"/>
+              </a:ext>
+            </a:extLst>
+          </p:cNvPr>
+          <p:cNvSpPr>
+            <a:spLocks noGrp="1"/>
+          </p:cNvSpPr>
+          <p:nvPr>
+            <p:ph type="sldNum" sz="quarter" idx="12"/>
+          </p:nvPr>
+        </p:nvSpPr>
+        <p:spPr/>
+        <p:txBody>
+          <a:bodyPr/>
+          <a:lstStyle/>
+          <a:p>
+            <a:fld id="{8D0AFDD5-844D-364D-8AEC-50CF4D36D55D}" type="slidenum">
+              <a:rPr lang="en-US" noProof="0" smtClean="0"/>
+              <a:t>20</a:t>
+            </a:fld>
+            <a:endParaRPr lang="en-US" noProof="0"/>
+          </a:p>
+        </p:txBody>
+      </p:sp>
+      <p:sp>
+        <p:nvSpPr>
+          <p:cNvPr id="3" name="Footer Placeholder 2">
+            <a:extLst>
+              <a:ext uri="{FF2B5EF4-FFF2-40B4-BE49-F238E27FC236}">
+                <a16:creationId xmlns:a16="http://schemas.microsoft.com/office/drawing/2014/main" id="{231C9157-8CBF-F340-6AE1-4A31DC33EB23}"/>
+              </a:ext>
+            </a:extLst>
+          </p:cNvPr>
+          <p:cNvSpPr>
+            <a:spLocks noGrp="1"/>
+          </p:cNvSpPr>
+          <p:nvPr>
+            <p:ph type="ftr" sz="quarter" idx="11"/>
+          </p:nvPr>
+        </p:nvSpPr>
+        <p:spPr/>
+        <p:txBody>
+          <a:bodyPr/>
+          <a:lstStyle/>
+          <a:p>
+            <a:r>
+              <a:rPr lang="en-US" noProof="0"/>
+              <a:t>Presentation title</a:t>
+            </a:r>
+          </a:p>
+        </p:txBody>
+      </p:sp>
+      <p:sp>
+        <p:nvSpPr>
+          <p:cNvPr id="4" name="Date Placeholder 3">
+            <a:extLst>
+              <a:ext uri="{FF2B5EF4-FFF2-40B4-BE49-F238E27FC236}">
+                <a16:creationId xmlns:a16="http://schemas.microsoft.com/office/drawing/2014/main" id="{F29FF13C-D598-EA2C-4499-D19FA0DD7A30}"/>
+              </a:ext>
+            </a:extLst>
+          </p:cNvPr>
+          <p:cNvSpPr>
+            <a:spLocks noGrp="1"/>
+          </p:cNvSpPr>
+          <p:nvPr>
+            <p:ph type="dt" sz="half" idx="10"/>
+          </p:nvPr>
+        </p:nvSpPr>
+        <p:spPr/>
+        <p:txBody>
+          <a:bodyPr/>
+          <a:lstStyle/>
+          <a:p>
+            <a:r>
+              <a:rPr lang="en-US" noProof="0"/>
+              <a:t>20XX</a:t>
+            </a:r>
+          </a:p>
+        </p:txBody>
+      </p:sp>
+      <p:pic>
+        <p:nvPicPr>
+          <p:cNvPr id="6" name="Picture 5">
+            <a:extLst>
+              <a:ext uri="{FF2B5EF4-FFF2-40B4-BE49-F238E27FC236}">
+                <a16:creationId xmlns:a16="http://schemas.microsoft.com/office/drawing/2014/main" id="{3824BE9C-7C4B-6C0B-861B-3ACA2AF333ED}"/>
+              </a:ext>
+            </a:extLst>
+          </p:cNvPr>
+          <p:cNvPicPr>
+            <a:picLocks noChangeAspect="1"/>
+          </p:cNvPicPr>
+          <p:nvPr/>
+        </p:nvPicPr>
+        <p:blipFill>
+          <a:blip r:embed="rId2"/>
+          <a:stretch>
+            <a:fillRect/>
+          </a:stretch>
+        </p:blipFill>
+        <p:spPr>
+          <a:xfrm>
+            <a:off x="83975" y="562087"/>
+            <a:ext cx="12024049" cy="6085705"/>
+          </a:xfrm>
+          <a:prstGeom prst="rect">
+            <a:avLst/>
+          </a:prstGeom>
+        </p:spPr>
+      </p:pic>
+    </p:spTree>
+    <p:extLst>
+      <p:ext uri="{BB962C8B-B14F-4D97-AF65-F5344CB8AC3E}">
+        <p14:creationId xmlns:p14="http://schemas.microsoft.com/office/powerpoint/2010/main" val="4048157958"/>
+      </p:ext>
+    </p:extLst>
+  </p:cSld>
+  <p:clrMapOvr>
+    <a:masterClrMapping/>
+  </p:clrMapOvr>
+</p:sld>
+</file>
+
+<file path=ppt/slides/slide21.xml><?xml version="1.0" encoding="utf-8"?>
 <p:sld xmlns:a="http://schemas.openxmlformats.org/drawingml/2006/main" xmlns:r="http://schemas.openxmlformats.org/officeDocument/2006/relationships" xmlns:p="http://schemas.openxmlformats.org/presentationml/2006/main">
   <p:cSld>
     <p:spTree>
@@ -17254,26 +17400,6 @@
 </file>
 
 <file path=customXml/item2.xml><?xml version="1.0" encoding="utf-8"?>
-<p:properties xmlns:p="http://schemas.microsoft.com/office/2006/metadata/properties" xmlns:xsi="http://www.w3.org/2001/XMLSchema-instance" xmlns:pc="http://schemas.microsoft.com/office/infopath/2007/PartnerControls">
-  <documentManagement>
-    <_ip_UnifiedCompliancePolicyUIAction xmlns="http://schemas.microsoft.com/sharepoint/v3" xsi:nil="true"/>
-    <Image xmlns="71af3243-3dd4-4a8d-8c0d-dd76da1f02a5">
-      <Url xsi:nil="true"/>
-      <Description xsi:nil="true"/>
-    </Image>
-    <Status xmlns="71af3243-3dd4-4a8d-8c0d-dd76da1f02a5">Not started</Status>
-    <Background xmlns="71af3243-3dd4-4a8d-8c0d-dd76da1f02a5">false</Background>
-    <_ip_UnifiedCompliancePolicyProperties xmlns="http://schemas.microsoft.com/sharepoint/v3" xsi:nil="true"/>
-    <ImageTagsTaxHTField xmlns="71af3243-3dd4-4a8d-8c0d-dd76da1f02a5">
-      <Terms xmlns="http://schemas.microsoft.com/office/infopath/2007/PartnerControls"/>
-    </ImageTagsTaxHTField>
-    <TaxCatchAll xmlns="230e9df3-be65-4c73-a93b-d1236ebd677e" xsi:nil="true"/>
-    <MediaServiceKeyPoints xmlns="71af3243-3dd4-4a8d-8c0d-dd76da1f02a5" xsi:nil="true"/>
-  </documentManagement>
-</p:properties>
-</file>
-
-<file path=customXml/item3.xml><?xml version="1.0" encoding="utf-8"?>
 <ct:contentTypeSchema xmlns:ct="http://schemas.microsoft.com/office/2006/metadata/contentType" xmlns:ma="http://schemas.microsoft.com/office/2006/metadata/properties/metaAttributes" ct:_="" ma:_="" ma:contentTypeName="Document" ma:contentTypeID="0x01010079F111ED35F8CC479449609E8A0923A6" ma:contentTypeVersion="24" ma:contentTypeDescription="Create a new document." ma:contentTypeScope="" ma:versionID="2d714a3296df14eba7a100bb665443ca">
   <xsd:schema xmlns:xsd="http://www.w3.org/2001/XMLSchema" xmlns:xs="http://www.w3.org/2001/XMLSchema" xmlns:p="http://schemas.microsoft.com/office/2006/metadata/properties" xmlns:ns1="http://schemas.microsoft.com/sharepoint/v3" xmlns:ns2="71af3243-3dd4-4a8d-8c0d-dd76da1f02a5" xmlns:ns3="16c05727-aa75-4e4a-9b5f-8a80a1165891" xmlns:ns4="230e9df3-be65-4c73-a93b-d1236ebd677e" targetNamespace="http://schemas.microsoft.com/office/2006/metadata/properties" ma:root="true" ma:fieldsID="49549bf45bfbbfb6cffed527380e77e1" ns1:_="" ns2:_="" ns3:_="" ns4:_="">
     <xsd:import namespace="http://schemas.microsoft.com/sharepoint/v3"/>
@@ -17561,6 +17687,26 @@
 </ct:contentTypeSchema>
 </file>
 
+<file path=customXml/item3.xml><?xml version="1.0" encoding="utf-8"?>
+<p:properties xmlns:p="http://schemas.microsoft.com/office/2006/metadata/properties" xmlns:xsi="http://www.w3.org/2001/XMLSchema-instance" xmlns:pc="http://schemas.microsoft.com/office/infopath/2007/PartnerControls">
+  <documentManagement>
+    <_ip_UnifiedCompliancePolicyUIAction xmlns="http://schemas.microsoft.com/sharepoint/v3" xsi:nil="true"/>
+    <Image xmlns="71af3243-3dd4-4a8d-8c0d-dd76da1f02a5">
+      <Url xsi:nil="true"/>
+      <Description xsi:nil="true"/>
+    </Image>
+    <Status xmlns="71af3243-3dd4-4a8d-8c0d-dd76da1f02a5">Not started</Status>
+    <Background xmlns="71af3243-3dd4-4a8d-8c0d-dd76da1f02a5">false</Background>
+    <_ip_UnifiedCompliancePolicyProperties xmlns="http://schemas.microsoft.com/sharepoint/v3" xsi:nil="true"/>
+    <ImageTagsTaxHTField xmlns="71af3243-3dd4-4a8d-8c0d-dd76da1f02a5">
+      <Terms xmlns="http://schemas.microsoft.com/office/infopath/2007/PartnerControls"/>
+    </ImageTagsTaxHTField>
+    <TaxCatchAll xmlns="230e9df3-be65-4c73-a93b-d1236ebd677e" xsi:nil="true"/>
+    <MediaServiceKeyPoints xmlns="71af3243-3dd4-4a8d-8c0d-dd76da1f02a5" xsi:nil="true"/>
+  </documentManagement>
+</p:properties>
+</file>
+
 <file path=customXml/itemProps1.xml><?xml version="1.0" encoding="utf-8"?>
 <ds:datastoreItem xmlns:ds="http://schemas.openxmlformats.org/officeDocument/2006/customXml" ds:itemID="{5FA78568-A730-4D3B-A489-FD854E91254A}">
   <ds:schemaRefs>
@@ -17570,25 +17716,6 @@
 </file>
 
 <file path=customXml/itemProps2.xml><?xml version="1.0" encoding="utf-8"?>
-<ds:datastoreItem xmlns:ds="http://schemas.openxmlformats.org/officeDocument/2006/customXml" ds:itemID="{61D9A46C-D3F3-4D45-B248-B831C6B5FC85}">
-  <ds:schemaRefs>
-    <ds:schemaRef ds:uri="http://purl.org/dc/dcmitype/"/>
-    <ds:schemaRef ds:uri="http://purl.org/dc/terms/"/>
-    <ds:schemaRef ds:uri="http://schemas.microsoft.com/office/infopath/2007/PartnerControls"/>
-    <ds:schemaRef ds:uri="http://schemas.microsoft.com/office/2006/documentManagement/types"/>
-    <ds:schemaRef ds:uri="http://schemas.microsoft.com/sharepoint/v3"/>
-    <ds:schemaRef ds:uri="16c05727-aa75-4e4a-9b5f-8a80a1165891"/>
-    <ds:schemaRef ds:uri="http://schemas.microsoft.com/office/2006/metadata/properties"/>
-    <ds:schemaRef ds:uri="http://schemas.openxmlformats.org/package/2006/metadata/core-properties"/>
-    <ds:schemaRef ds:uri="http://purl.org/dc/elements/1.1/"/>
-    <ds:schemaRef ds:uri="230e9df3-be65-4c73-a93b-d1236ebd677e"/>
-    <ds:schemaRef ds:uri="71af3243-3dd4-4a8d-8c0d-dd76da1f02a5"/>
-    <ds:schemaRef ds:uri="http://www.w3.org/XML/1998/namespace"/>
-  </ds:schemaRefs>
-</ds:datastoreItem>
-</file>
-
-<file path=customXml/itemProps3.xml><?xml version="1.0" encoding="utf-8"?>
 <ds:datastoreItem xmlns:ds="http://schemas.openxmlformats.org/officeDocument/2006/customXml" ds:itemID="{A7D90517-43A3-4BC6-B197-5C7B7D3DBCAD}">
   <ds:schemaRefs>
     <ds:schemaRef ds:uri="http://schemas.microsoft.com/office/2006/metadata/contentType"/>
@@ -17609,6 +17736,25 @@
 </ds:datastoreItem>
 </file>
 
+<file path=customXml/itemProps3.xml><?xml version="1.0" encoding="utf-8"?>
+<ds:datastoreItem xmlns:ds="http://schemas.openxmlformats.org/officeDocument/2006/customXml" ds:itemID="{61D9A46C-D3F3-4D45-B248-B831C6B5FC85}">
+  <ds:schemaRefs>
+    <ds:schemaRef ds:uri="http://purl.org/dc/dcmitype/"/>
+    <ds:schemaRef ds:uri="http://purl.org/dc/terms/"/>
+    <ds:schemaRef ds:uri="http://schemas.microsoft.com/office/infopath/2007/PartnerControls"/>
+    <ds:schemaRef ds:uri="http://schemas.microsoft.com/office/2006/documentManagement/types"/>
+    <ds:schemaRef ds:uri="http://schemas.microsoft.com/sharepoint/v3"/>
+    <ds:schemaRef ds:uri="16c05727-aa75-4e4a-9b5f-8a80a1165891"/>
+    <ds:schemaRef ds:uri="http://schemas.microsoft.com/office/2006/metadata/properties"/>
+    <ds:schemaRef ds:uri="http://schemas.openxmlformats.org/package/2006/metadata/core-properties"/>
+    <ds:schemaRef ds:uri="http://purl.org/dc/elements/1.1/"/>
+    <ds:schemaRef ds:uri="230e9df3-be65-4c73-a93b-d1236ebd677e"/>
+    <ds:schemaRef ds:uri="71af3243-3dd4-4a8d-8c0d-dd76da1f02a5"/>
+    <ds:schemaRef ds:uri="http://www.w3.org/XML/1998/namespace"/>
+  </ds:schemaRefs>
+</ds:datastoreItem>
+</file>
+
 <file path=docMetadata/LabelInfo.xml><?xml version="1.0" encoding="utf-8"?>
 <clbl:labelList xmlns:clbl="http://schemas.microsoft.com/office/2020/mipLabelMetadata"/>
 </file>
</xml_diff>